<commit_message>
added more DRAM controller details
</commit_message>
<xml_diff>
--- a/Writing Cache Efficient Code.pptx
+++ b/Writing Cache Efficient Code.pptx
@@ -5,10 +5,10 @@
     <p:sldMasterId id="2147483660" r:id="rId1"/>
   </p:sldMasterIdLst>
   <p:notesMasterIdLst>
-    <p:notesMasterId r:id="rId12"/>
+    <p:notesMasterId r:id="rId14"/>
   </p:notesMasterIdLst>
   <p:handoutMasterIdLst>
-    <p:handoutMasterId r:id="rId13"/>
+    <p:handoutMasterId r:id="rId15"/>
   </p:handoutMasterIdLst>
   <p:sldIdLst>
     <p:sldId id="273" r:id="rId2"/>
@@ -19,8 +19,10 @@
     <p:sldId id="393" r:id="rId7"/>
     <p:sldId id="387" r:id="rId8"/>
     <p:sldId id="394" r:id="rId9"/>
-    <p:sldId id="395" r:id="rId10"/>
-    <p:sldId id="396" r:id="rId11"/>
+    <p:sldId id="397" r:id="rId10"/>
+    <p:sldId id="399" r:id="rId11"/>
+    <p:sldId id="396" r:id="rId12"/>
+    <p:sldId id="395" r:id="rId13"/>
   </p:sldIdLst>
   <p:sldSz cx="12192000" cy="6858000"/>
   <p:notesSz cx="6858000" cy="9144000"/>
@@ -120,30 +122,6 @@
     </a:lvl9pPr>
   </p:defaultTextStyle>
   <p:extLst>
-    <p:ext uri="{521415D9-36F7-43E2-AB2F-B90AF26B5E84}">
-      <p14:sectionLst xmlns:p14="http://schemas.microsoft.com/office/powerpoint/2010/main">
-        <p14:section name="Velkommen" id="{E75E278A-FF0E-49A4-B170-79828D63BBAD}">
-          <p14:sldIdLst>
-            <p14:sldId id="273"/>
-            <p14:sldId id="382"/>
-            <p14:sldId id="383"/>
-            <p14:sldId id="392"/>
-            <p14:sldId id="391"/>
-            <p14:sldId id="393"/>
-            <p14:sldId id="387"/>
-            <p14:sldId id="394"/>
-            <p14:sldId id="395"/>
-            <p14:sldId id="396"/>
-          </p14:sldIdLst>
-        </p14:section>
-        <p14:section name="Kommandoer, kommentarer, gruppearbeid, valgruten, pålogging" id="{B9B51309-D148-4332-87C2-07BE32FBCA3B}">
-          <p14:sldIdLst/>
-        </p14:section>
-        <p14:section name="Les mer" id="{2CC34DB2-6590-42C0-AD4B-A04C6060184E}">
-          <p14:sldIdLst/>
-        </p14:section>
-      </p14:sectionLst>
-    </p:ext>
     <p:ext uri="{EFAFB233-063F-42B5-8137-9DF3F51BA10A}">
       <p15:sldGuideLst xmlns:p15="http://schemas.microsoft.com/office/powerpoint/2012/main">
         <p15:guide id="1" orient="horz" pos="2160" userDrawn="1">
@@ -265,7 +243,7 @@
           <a:p>
             <a:fld id="{A93E2030-7BCB-494B-8551-076F6604B4FA}" type="datetime1">
               <a:rPr lang="nb-NO" smtClean="0"/>
-              <a:t>26.12.2022</a:t>
+              <a:t>27.12.2022</a:t>
             </a:fld>
             <a:endParaRPr lang="nb-NO" dirty="0"/>
           </a:p>
@@ -444,7 +422,7 @@
             <a:fld id="{C6EE3029-6765-42B1-9673-C7FD8BC09E7C}" type="datetime1">
               <a:rPr lang="nb-NO" smtClean="0"/>
               <a:pPr/>
-              <a:t>26.12.2022</a:t>
+              <a:t>27.12.2022</a:t>
             </a:fld>
             <a:endParaRPr lang="nb-NO" dirty="0"/>
           </a:p>
@@ -1081,7 +1059,7 @@
             <a:fld id="{5692DBF7-F76E-4278-BC0F-9E1A1465BDD7}" type="datetime1">
               <a:rPr lang="nb-NO" smtClean="0"/>
               <a:pPr/>
-              <a:t>26.12.2022</a:t>
+              <a:t>27.12.2022</a:t>
             </a:fld>
             <a:endParaRPr lang="nb-NO" dirty="0"/>
           </a:p>
@@ -1855,7 +1833,7 @@
             <a:fld id="{FFEDCDF8-7798-4AC0-B641-35F0E9E87DF9}" type="datetime1">
               <a:rPr lang="nb-NO" smtClean="0"/>
               <a:pPr/>
-              <a:t>26.12.2022</a:t>
+              <a:t>27.12.2022</a:t>
             </a:fld>
             <a:endParaRPr lang="nb-NO" dirty="0"/>
           </a:p>
@@ -2362,13 +2340,13 @@
         </p:nvSpPr>
         <p:spPr>
           <a:xfrm>
-            <a:off x="828726" y="3291920"/>
-            <a:ext cx="9582736" cy="1133856"/>
+            <a:off x="828726" y="3291919"/>
+            <a:ext cx="9582736" cy="2401755"/>
           </a:xfrm>
         </p:spPr>
         <p:txBody>
           <a:bodyPr rtlCol="0">
-            <a:normAutofit fontScale="92500" lnSpcReduction="10000"/>
+            <a:normAutofit/>
           </a:bodyPr>
           <a:lstStyle/>
           <a:p>
@@ -2412,6 +2390,124 @@
               </a:rPr>
               <a:t>Oslohack:22</a:t>
             </a:r>
+          </a:p>
+          <a:p>
+            <a:pPr marL="0" indent="0" rtl="0">
+              <a:buNone/>
+            </a:pPr>
+            <a:endParaRPr lang="nb-NO" sz="2400" dirty="0">
+              <a:solidFill>
+                <a:schemeClr val="bg1"/>
+              </a:solidFill>
+              <a:latin typeface="Arial" panose="020B0604020202020204" pitchFamily="34" charset="0"/>
+              <a:cs typeface="Arial" panose="020B0604020202020204" pitchFamily="34" charset="0"/>
+            </a:endParaRPr>
+          </a:p>
+          <a:p>
+            <a:pPr marL="0" indent="0" rtl="0">
+              <a:buNone/>
+            </a:pPr>
+            <a:r>
+              <a:rPr lang="nb-NO" sz="2400" dirty="0" err="1">
+                <a:solidFill>
+                  <a:schemeClr val="bg1"/>
+                </a:solidFill>
+                <a:latin typeface="Arial" panose="020B0604020202020204" pitchFamily="34" charset="0"/>
+                <a:cs typeface="Arial" panose="020B0604020202020204" pitchFamily="34" charset="0"/>
+              </a:rPr>
+              <a:t>https</a:t>
+            </a:r>
+            <a:r>
+              <a:rPr lang="nb-NO" sz="2400" dirty="0">
+                <a:solidFill>
+                  <a:schemeClr val="bg1"/>
+                </a:solidFill>
+                <a:latin typeface="Arial" panose="020B0604020202020204" pitchFamily="34" charset="0"/>
+                <a:cs typeface="Arial" panose="020B0604020202020204" pitchFamily="34" charset="0"/>
+              </a:rPr>
+              <a:t>://</a:t>
+            </a:r>
+            <a:r>
+              <a:rPr lang="nb-NO" sz="2400" dirty="0" err="1">
+                <a:solidFill>
+                  <a:schemeClr val="bg1"/>
+                </a:solidFill>
+                <a:latin typeface="Arial" panose="020B0604020202020204" pitchFamily="34" charset="0"/>
+                <a:cs typeface="Arial" panose="020B0604020202020204" pitchFamily="34" charset="0"/>
+              </a:rPr>
+              <a:t>github.com</a:t>
+            </a:r>
+            <a:r>
+              <a:rPr lang="nb-NO" sz="2400" dirty="0">
+                <a:solidFill>
+                  <a:schemeClr val="bg1"/>
+                </a:solidFill>
+                <a:latin typeface="Arial" panose="020B0604020202020204" pitchFamily="34" charset="0"/>
+                <a:cs typeface="Arial" panose="020B0604020202020204" pitchFamily="34" charset="0"/>
+              </a:rPr>
+              <a:t>/</a:t>
+            </a:r>
+            <a:r>
+              <a:rPr lang="nb-NO" sz="2400" dirty="0" err="1">
+                <a:solidFill>
+                  <a:schemeClr val="bg1"/>
+                </a:solidFill>
+                <a:latin typeface="Arial" panose="020B0604020202020204" pitchFamily="34" charset="0"/>
+                <a:cs typeface="Arial" panose="020B0604020202020204" pitchFamily="34" charset="0"/>
+              </a:rPr>
+              <a:t>runehol</a:t>
+            </a:r>
+            <a:r>
+              <a:rPr lang="nb-NO" sz="2400" dirty="0">
+                <a:solidFill>
+                  <a:schemeClr val="bg1"/>
+                </a:solidFill>
+                <a:latin typeface="Arial" panose="020B0604020202020204" pitchFamily="34" charset="0"/>
+                <a:cs typeface="Arial" panose="020B0604020202020204" pitchFamily="34" charset="0"/>
+              </a:rPr>
+              <a:t>/</a:t>
+            </a:r>
+            <a:r>
+              <a:rPr lang="nb-NO" sz="2400" dirty="0" err="1">
+                <a:solidFill>
+                  <a:schemeClr val="bg1"/>
+                </a:solidFill>
+                <a:latin typeface="Arial" panose="020B0604020202020204" pitchFamily="34" charset="0"/>
+                <a:cs typeface="Arial" panose="020B0604020202020204" pitchFamily="34" charset="0"/>
+              </a:rPr>
+              <a:t>cache_efficiency_talk</a:t>
+            </a:r>
+            <a:endParaRPr lang="nb-NO" sz="2400" dirty="0">
+              <a:solidFill>
+                <a:schemeClr val="bg1"/>
+              </a:solidFill>
+              <a:latin typeface="Arial" panose="020B0604020202020204" pitchFamily="34" charset="0"/>
+              <a:cs typeface="Arial" panose="020B0604020202020204" pitchFamily="34" charset="0"/>
+            </a:endParaRPr>
+          </a:p>
+          <a:p>
+            <a:pPr marL="0" indent="0" rtl="0">
+              <a:buNone/>
+            </a:pPr>
+            <a:endParaRPr lang="nb-NO" sz="2400" dirty="0">
+              <a:solidFill>
+                <a:schemeClr val="bg1"/>
+              </a:solidFill>
+              <a:latin typeface="Arial" panose="020B0604020202020204" pitchFamily="34" charset="0"/>
+              <a:cs typeface="Arial" panose="020B0604020202020204" pitchFamily="34" charset="0"/>
+            </a:endParaRPr>
+          </a:p>
+          <a:p>
+            <a:pPr marL="0" indent="0" rtl="0">
+              <a:buNone/>
+            </a:pPr>
+            <a:endParaRPr lang="nb-NO" sz="2400" dirty="0">
+              <a:solidFill>
+                <a:schemeClr val="bg1"/>
+              </a:solidFill>
+              <a:latin typeface="Arial" panose="020B0604020202020204" pitchFamily="34" charset="0"/>
+              <a:cs typeface="Arial" panose="020B0604020202020204" pitchFamily="34" charset="0"/>
+            </a:endParaRPr>
           </a:p>
         </p:txBody>
       </p:sp>
@@ -2429,6 +2525,172 @@
 </file>
 
 <file path=ppt/slides/slide10.xml><?xml version="1.0" encoding="utf-8"?>
+<p:sld xmlns:a="http://schemas.openxmlformats.org/drawingml/2006/main" xmlns:r="http://schemas.openxmlformats.org/officeDocument/2006/relationships" xmlns:p="http://schemas.openxmlformats.org/presentationml/2006/main">
+  <p:cSld>
+    <p:spTree>
+      <p:nvGrpSpPr>
+        <p:cNvPr id="1" name=""/>
+        <p:cNvGrpSpPr/>
+        <p:nvPr/>
+      </p:nvGrpSpPr>
+      <p:grpSpPr>
+        <a:xfrm>
+          <a:off x="0" y="0"/>
+          <a:ext cx="0" cy="0"/>
+          <a:chOff x="0" y="0"/>
+          <a:chExt cx="0" cy="0"/>
+        </a:xfrm>
+      </p:grpSpPr>
+      <p:sp>
+        <p:nvSpPr>
+          <p:cNvPr id="2" name="Title 1">
+            <a:extLst>
+              <a:ext uri="{FF2B5EF4-FFF2-40B4-BE49-F238E27FC236}">
+                <a16:creationId xmlns:a16="http://schemas.microsoft.com/office/drawing/2014/main" id="{74863B27-BEFB-2593-9357-60A847E1F106}"/>
+              </a:ext>
+            </a:extLst>
+          </p:cNvPr>
+          <p:cNvSpPr>
+            <a:spLocks noGrp="1"/>
+          </p:cNvSpPr>
+          <p:nvPr>
+            <p:ph type="title"/>
+          </p:nvPr>
+        </p:nvSpPr>
+        <p:spPr/>
+        <p:txBody>
+          <a:bodyPr>
+            <a:normAutofit fontScale="90000"/>
+          </a:bodyPr>
+          <a:lstStyle/>
+          <a:p>
+            <a:r>
+              <a:rPr lang="en-NO" dirty="0"/>
+              <a:t>How does DRAM work?</a:t>
+            </a:r>
+          </a:p>
+        </p:txBody>
+      </p:sp>
+      <p:sp>
+        <p:nvSpPr>
+          <p:cNvPr id="3" name="Content Placeholder 2">
+            <a:extLst>
+              <a:ext uri="{FF2B5EF4-FFF2-40B4-BE49-F238E27FC236}">
+                <a16:creationId xmlns:a16="http://schemas.microsoft.com/office/drawing/2014/main" id="{B34693AF-A567-9676-C681-7DF3C300B6F1}"/>
+              </a:ext>
+            </a:extLst>
+          </p:cNvPr>
+          <p:cNvSpPr>
+            <a:spLocks noGrp="1"/>
+          </p:cNvSpPr>
+          <p:nvPr>
+            <p:ph idx="1"/>
+          </p:nvPr>
+        </p:nvSpPr>
+        <p:spPr>
+          <a:xfrm>
+            <a:off x="479424" y="1171111"/>
+            <a:ext cx="4856503" cy="5426459"/>
+          </a:xfrm>
+        </p:spPr>
+        <p:txBody>
+          <a:bodyPr>
+            <a:normAutofit fontScale="92500" lnSpcReduction="20000"/>
+          </a:bodyPr>
+          <a:lstStyle/>
+          <a:p>
+            <a:r>
+              <a:rPr lang="en-NO" dirty="0"/>
+              <a:t>Cannot access random locations at full speed</a:t>
+            </a:r>
+          </a:p>
+          <a:p>
+            <a:r>
+              <a:rPr lang="en-NO" dirty="0"/>
+              <a:t>Instead, DRAM is split into one or more memory controllers, divided into multiple banks, and each bank can hold a page (few KB) in the row buffer for modification</a:t>
+            </a:r>
+          </a:p>
+          <a:p>
+            <a:endParaRPr lang="en-NO" dirty="0"/>
+          </a:p>
+          <a:p>
+            <a:r>
+              <a:rPr lang="en-NO" dirty="0"/>
+              <a:t>To access a new page, the new page must be loaded into the row buffer</a:t>
+            </a:r>
+          </a:p>
+          <a:p>
+            <a:endParaRPr lang="en-NO" dirty="0"/>
+          </a:p>
+          <a:p>
+            <a:r>
+              <a:rPr lang="en-NO" dirty="0"/>
+              <a:t>Switching between reads and writes also costs – DRAM controllers tend to have buffering of requests to get consecutive reads to the same page and writes to the same page</a:t>
+            </a:r>
+          </a:p>
+        </p:txBody>
+      </p:sp>
+      <p:pic>
+        <p:nvPicPr>
+          <p:cNvPr id="5" name="Picture 2" descr="Characteristics of a DRAM-based memory system. ">
+            <a:extLst>
+              <a:ext uri="{FF2B5EF4-FFF2-40B4-BE49-F238E27FC236}">
+                <a16:creationId xmlns:a16="http://schemas.microsoft.com/office/drawing/2014/main" id="{C2454EA4-1452-0986-B1EC-AF68D455A766}"/>
+              </a:ext>
+            </a:extLst>
+          </p:cNvPr>
+          <p:cNvPicPr>
+            <a:picLocks noChangeAspect="1" noChangeArrowheads="1"/>
+          </p:cNvPicPr>
+          <p:nvPr/>
+        </p:nvPicPr>
+        <p:blipFill>
+          <a:blip r:embed="rId2">
+            <a:extLst>
+              <a:ext uri="{28A0092B-C50C-407E-A947-70E740481C1C}">
+                <a14:useLocalDpi xmlns:a14="http://schemas.microsoft.com/office/drawing/2010/main" val="0"/>
+              </a:ext>
+            </a:extLst>
+          </a:blip>
+          <a:srcRect/>
+          <a:stretch>
+            <a:fillRect/>
+          </a:stretch>
+        </p:blipFill>
+        <p:spPr bwMode="auto">
+          <a:xfrm>
+            <a:off x="5335928" y="1287295"/>
+            <a:ext cx="6856071" cy="2613373"/>
+          </a:xfrm>
+          <a:prstGeom prst="rect">
+            <a:avLst/>
+          </a:prstGeom>
+          <a:noFill/>
+          <a:extLst>
+            <a:ext uri="{909E8E84-426E-40DD-AFC4-6F175D3DCCD1}">
+              <a14:hiddenFill xmlns:a14="http://schemas.microsoft.com/office/drawing/2010/main">
+                <a:solidFill>
+                  <a:srgbClr val="FFFFFF"/>
+                </a:solidFill>
+              </a14:hiddenFill>
+            </a:ext>
+          </a:extLst>
+        </p:spPr>
+      </p:pic>
+    </p:spTree>
+    <p:extLst>
+      <p:ext uri="{BB962C8B-B14F-4D97-AF65-F5344CB8AC3E}">
+        <p14:creationId xmlns:p14="http://schemas.microsoft.com/office/powerpoint/2010/main" val="1185034693"/>
+      </p:ext>
+    </p:extLst>
+  </p:cSld>
+  <p:clrMapOvr>
+    <a:masterClrMapping/>
+  </p:clrMapOvr>
+</p:sld>
+</file>
+
+<file path=ppt/slides/slide11.xml><?xml version="1.0" encoding="utf-8"?>
 <p:sld xmlns:a="http://schemas.openxmlformats.org/drawingml/2006/main" xmlns:r="http://schemas.openxmlformats.org/officeDocument/2006/relationships" xmlns:p="http://schemas.openxmlformats.org/presentationml/2006/main">
   <p:cSld>
     <p:spTree>
@@ -2470,7 +2732,7 @@
           <a:p>
             <a:r>
               <a:rPr lang="en-NO" dirty="0"/>
-              <a:t>Bonus: How does DRAM work?</a:t>
+              <a:t>How does DRAM work?</a:t>
             </a:r>
           </a:p>
         </p:txBody>
@@ -2491,14 +2753,14 @@
             <p:ph idx="1"/>
             <p:extLst>
               <p:ext uri="{D42A27DB-BD31-4B8C-83A1-F6EECF244321}">
-                <p14:modId xmlns:p14="http://schemas.microsoft.com/office/powerpoint/2010/main" val="3666584728"/>
+                <p14:modId xmlns:p14="http://schemas.microsoft.com/office/powerpoint/2010/main" val="2765048426"/>
               </p:ext>
             </p:extLst>
           </p:nvPr>
         </p:nvGraphicFramePr>
         <p:xfrm>
-          <a:off x="2217433" y="4947599"/>
-          <a:ext cx="8426369" cy="1737360"/>
+          <a:off x="2159559" y="4818209"/>
+          <a:ext cx="8847964" cy="1737360"/>
         </p:xfrm>
         <a:graphic>
           <a:graphicData uri="http://schemas.openxmlformats.org/drawingml/2006/table">
@@ -2507,34 +2769,41 @@
                 <a:tableStyleId>{B301B821-A1FF-4177-AEE7-76D212191A09}</a:tableStyleId>
               </a:tblPr>
               <a:tblGrid>
-                <a:gridCol w="4364226">
+                <a:gridCol w="3927621">
                   <a:extLst>
                     <a:ext uri="{9D8B030D-6E8A-4147-A177-3AD203B41FA5}">
                       <a16:colId xmlns:a16="http://schemas.microsoft.com/office/drawing/2014/main" val="1709336776"/>
                     </a:ext>
                   </a:extLst>
                 </a:gridCol>
-                <a:gridCol w="1230042">
+                <a:gridCol w="1106986">
                   <a:extLst>
                     <a:ext uri="{9D8B030D-6E8A-4147-A177-3AD203B41FA5}">
                       <a16:colId xmlns:a16="http://schemas.microsoft.com/office/drawing/2014/main" val="2642991365"/>
                     </a:ext>
                   </a:extLst>
                 </a:gridCol>
-                <a:gridCol w="1426943">
+                <a:gridCol w="1284189">
                   <a:extLst>
                     <a:ext uri="{9D8B030D-6E8A-4147-A177-3AD203B41FA5}">
                       <a16:colId xmlns:a16="http://schemas.microsoft.com/office/drawing/2014/main" val="1176368045"/>
                     </a:ext>
                   </a:extLst>
                 </a:gridCol>
-                <a:gridCol w="1405158">
+                <a:gridCol w="1264584">
                   <a:extLst>
                     <a:ext uri="{9D8B030D-6E8A-4147-A177-3AD203B41FA5}">
                       <a16:colId xmlns:a16="http://schemas.microsoft.com/office/drawing/2014/main" val="3048834973"/>
                     </a:ext>
                   </a:extLst>
                 </a:gridCol>
+                <a:gridCol w="1264584">
+                  <a:extLst>
+                    <a:ext uri="{9D8B030D-6E8A-4147-A177-3AD203B41FA5}">
+                      <a16:colId xmlns:a16="http://schemas.microsoft.com/office/drawing/2014/main" val="1473600244"/>
+                    </a:ext>
+                  </a:extLst>
+                </a:gridCol>
               </a:tblGrid>
               <a:tr h="451606">
                 <a:tc>
@@ -2584,6 +2853,19 @@
                       <a:r>
                         <a:rPr lang="en-NO" sz="1400" dirty="0"/>
                         <a:t>Actual bandwidth</a:t>
+                      </a:r>
+                    </a:p>
+                  </a:txBody>
+                  <a:tcPr/>
+                </a:tc>
+                <a:tc>
+                  <a:txBody>
+                    <a:bodyPr/>
+                    <a:lstStyle/>
+                    <a:p>
+                      <a:r>
+                        <a:rPr lang="en-NO" sz="1400" dirty="0"/>
+                        <a:t>Efficiency</a:t>
                       </a:r>
                     </a:p>
                   </a:txBody>
@@ -2657,6 +2939,20 @@
                   </a:txBody>
                   <a:tcPr/>
                 </a:tc>
+                <a:tc>
+                  <a:txBody>
+                    <a:bodyPr/>
+                    <a:lstStyle/>
+                    <a:p>
+                      <a:pPr marL="0" algn="r" defTabSz="914400" rtl="0" eaLnBrk="1" latinLnBrk="0" hangingPunct="1"/>
+                      <a:r>
+                        <a:rPr lang="en-NO" sz="1400" dirty="0"/>
+                        <a:t>100%</a:t>
+                      </a:r>
+                    </a:p>
+                  </a:txBody>
+                  <a:tcPr/>
+                </a:tc>
                 <a:extLst>
                   <a:ext uri="{0D108BD9-81ED-4DB2-BD59-A6C34878D82A}">
                     <a16:rowId xmlns:a16="http://schemas.microsoft.com/office/drawing/2014/main" val="3124958658"/>
@@ -2724,13 +3020,27 @@
                   </a:txBody>
                   <a:tcPr/>
                 </a:tc>
+                <a:tc>
+                  <a:txBody>
+                    <a:bodyPr/>
+                    <a:lstStyle/>
+                    <a:p>
+                      <a:pPr marL="0" algn="r" defTabSz="914400" rtl="0" eaLnBrk="1" latinLnBrk="0" hangingPunct="1"/>
+                      <a:r>
+                        <a:rPr lang="en-NO" sz="1400" dirty="0"/>
+                        <a:t>33%</a:t>
+                      </a:r>
+                    </a:p>
+                  </a:txBody>
+                  <a:tcPr/>
+                </a:tc>
                 <a:extLst>
                   <a:ext uri="{0D108BD9-81ED-4DB2-BD59-A6C34878D82A}">
                     <a16:rowId xmlns:a16="http://schemas.microsoft.com/office/drawing/2014/main" val="2219301568"/>
                   </a:ext>
                 </a:extLst>
               </a:tr>
-              <a:tr h="265651">
+              <a:tr h="0">
                 <a:tc>
                   <a:txBody>
                     <a:bodyPr/>
@@ -2786,6 +3096,20 @@
                       <a:r>
                         <a:rPr lang="en-NO" sz="1400" dirty="0"/>
                         <a:t>680 MB/s</a:t>
+                      </a:r>
+                    </a:p>
+                  </a:txBody>
+                  <a:tcPr/>
+                </a:tc>
+                <a:tc>
+                  <a:txBody>
+                    <a:bodyPr/>
+                    <a:lstStyle/>
+                    <a:p>
+                      <a:pPr marL="0" algn="r" defTabSz="914400" rtl="0" eaLnBrk="1" latinLnBrk="0" hangingPunct="1"/>
+                      <a:r>
+                        <a:rPr lang="en-NO" sz="1400" dirty="0"/>
+                        <a:t>63%</a:t>
                       </a:r>
                     </a:p>
                   </a:txBody>
@@ -2853,6 +3177,20 @@
                       <a:r>
                         <a:rPr lang="en-NO" sz="1400" dirty="0"/>
                         <a:t>336 MB/s</a:t>
+                      </a:r>
+                    </a:p>
+                  </a:txBody>
+                  <a:tcPr/>
+                </a:tc>
+                <a:tc>
+                  <a:txBody>
+                    <a:bodyPr/>
+                    <a:lstStyle/>
+                    <a:p>
+                      <a:pPr marL="0" algn="r" defTabSz="914400" rtl="0" eaLnBrk="1" latinLnBrk="0" hangingPunct="1"/>
+                      <a:r>
+                        <a:rPr lang="en-NO" sz="1400" dirty="0"/>
+                        <a:t>31%</a:t>
                       </a:r>
                     </a:p>
                   </a:txBody>
@@ -2897,8 +3235,8 @@
         </p:blipFill>
         <p:spPr bwMode="auto">
           <a:xfrm>
-            <a:off x="4691676" y="1041721"/>
-            <a:ext cx="7500324" cy="2858947"/>
+            <a:off x="5335928" y="1287295"/>
+            <a:ext cx="6856071" cy="2613373"/>
           </a:xfrm>
           <a:prstGeom prst="rect">
             <a:avLst/>
@@ -2931,8 +3269,8 @@
         </p:nvSpPr>
         <p:spPr>
           <a:xfrm>
-            <a:off x="479425" y="1171111"/>
-            <a:ext cx="4381942" cy="3067291"/>
+            <a:off x="479424" y="1171111"/>
+            <a:ext cx="4856503" cy="3067291"/>
           </a:xfrm>
           <a:prstGeom prst="rect">
             <a:avLst/>
@@ -3171,7 +3509,13 @@
           <a:p>
             <a:r>
               <a:rPr lang="en-NO" dirty="0"/>
-              <a:t>DRAM split into one or more memory controllers, divided into multiple banks, and each bank can hold a page (few KB) in the row buffer for modification</a:t>
+              <a:t>Best access pattern: Sequential accesses to the same page, either all reads or all writes</a:t>
+            </a:r>
+          </a:p>
+          <a:p>
+            <a:r>
+              <a:rPr lang="en-NO" dirty="0"/>
+              <a:t>Worst access pattern: random addresses, mix of reads and writes</a:t>
             </a:r>
           </a:p>
           <a:p>
@@ -3179,130 +3523,6 @@
               <a:rPr lang="en-NO" dirty="0"/>
               <a:t>Rule of thumb: Best memory access pattern to worst memory access pattern: 3x difference</a:t>
             </a:r>
-          </a:p>
-        </p:txBody>
-      </p:sp>
-      <p:sp>
-        <p:nvSpPr>
-          <p:cNvPr id="6" name="TextBox 5">
-            <a:extLst>
-              <a:ext uri="{FF2B5EF4-FFF2-40B4-BE49-F238E27FC236}">
-                <a16:creationId xmlns:a16="http://schemas.microsoft.com/office/drawing/2014/main" id="{98EF4DFD-34B4-7B43-9F00-9CED7D4A386A}"/>
-              </a:ext>
-            </a:extLst>
-          </p:cNvPr>
-          <p:cNvSpPr txBox="1"/>
-          <p:nvPr/>
-        </p:nvSpPr>
-        <p:spPr>
-          <a:xfrm>
-            <a:off x="10852147" y="5795782"/>
-            <a:ext cx="464871" cy="249299"/>
-          </a:xfrm>
-          <a:prstGeom prst="rect">
-            <a:avLst/>
-          </a:prstGeom>
-          <a:noFill/>
-        </p:spPr>
-        <p:txBody>
-          <a:bodyPr wrap="none" lIns="0" tIns="0" rIns="0" bIns="0" rtlCol="0">
-            <a:spAutoFit/>
-          </a:bodyPr>
-          <a:lstStyle/>
-          <a:p>
-            <a:pPr marL="0" indent="0" algn="l" defTabSz="914400" rtl="0" eaLnBrk="1" latinLnBrk="0" hangingPunct="1">
-              <a:lnSpc>
-                <a:spcPct val="90000"/>
-              </a:lnSpc>
-              <a:spcBef>
-                <a:spcPts val="0"/>
-              </a:spcBef>
-              <a:spcAft>
-                <a:spcPts val="600"/>
-              </a:spcAft>
-              <a:buFont typeface="Arial" panose="020B0604020202020204" pitchFamily="34" charset="0"/>
-              <a:buNone/>
-            </a:pPr>
-            <a:r>
-              <a:rPr lang="en-NO" dirty="0">
-                <a:solidFill>
-                  <a:schemeClr val="tx2"/>
-                </a:solidFill>
-                <a:latin typeface="+mn-lt"/>
-                <a:ea typeface="+mn-ea"/>
-              </a:rPr>
-              <a:t>(1/3)</a:t>
-            </a:r>
-            <a:endParaRPr lang="en-NO" kern="1200" dirty="0">
-              <a:solidFill>
-                <a:schemeClr val="tx2"/>
-              </a:solidFill>
-              <a:latin typeface="+mn-lt"/>
-              <a:ea typeface="+mn-ea"/>
-              <a:cs typeface="+mn-cs"/>
-            </a:endParaRPr>
-          </a:p>
-        </p:txBody>
-      </p:sp>
-      <p:sp>
-        <p:nvSpPr>
-          <p:cNvPr id="9" name="TextBox 8">
-            <a:extLst>
-              <a:ext uri="{FF2B5EF4-FFF2-40B4-BE49-F238E27FC236}">
-                <a16:creationId xmlns:a16="http://schemas.microsoft.com/office/drawing/2014/main" id="{5BCCEA60-3375-A94E-BFC2-2BD268F72123}"/>
-              </a:ext>
-            </a:extLst>
-          </p:cNvPr>
-          <p:cNvSpPr txBox="1"/>
-          <p:nvPr/>
-        </p:nvSpPr>
-        <p:spPr>
-          <a:xfrm>
-            <a:off x="10840572" y="6423433"/>
-            <a:ext cx="464871" cy="249299"/>
-          </a:xfrm>
-          <a:prstGeom prst="rect">
-            <a:avLst/>
-          </a:prstGeom>
-          <a:noFill/>
-        </p:spPr>
-        <p:txBody>
-          <a:bodyPr wrap="none" lIns="0" tIns="0" rIns="0" bIns="0" rtlCol="0">
-            <a:spAutoFit/>
-          </a:bodyPr>
-          <a:lstStyle/>
-          <a:p>
-            <a:pPr marL="0" indent="0" algn="l" defTabSz="914400" rtl="0" eaLnBrk="1" latinLnBrk="0" hangingPunct="1">
-              <a:lnSpc>
-                <a:spcPct val="90000"/>
-              </a:lnSpc>
-              <a:spcBef>
-                <a:spcPts val="0"/>
-              </a:spcBef>
-              <a:spcAft>
-                <a:spcPts val="600"/>
-              </a:spcAft>
-              <a:buFont typeface="Arial" panose="020B0604020202020204" pitchFamily="34" charset="0"/>
-              <a:buNone/>
-            </a:pPr>
-            <a:r>
-              <a:rPr lang="en-NO" dirty="0">
-                <a:solidFill>
-                  <a:schemeClr val="tx2"/>
-                </a:solidFill>
-                <a:latin typeface="+mn-lt"/>
-                <a:ea typeface="+mn-ea"/>
-              </a:rPr>
-              <a:t>(1/3)</a:t>
-            </a:r>
-            <a:endParaRPr lang="en-NO" kern="1200" dirty="0">
-              <a:solidFill>
-                <a:schemeClr val="tx2"/>
-              </a:solidFill>
-              <a:latin typeface="+mn-lt"/>
-              <a:ea typeface="+mn-ea"/>
-              <a:cs typeface="+mn-cs"/>
-            </a:endParaRPr>
           </a:p>
         </p:txBody>
       </p:sp>
@@ -3310,6 +3530,160 @@
     <p:extLst>
       <p:ext uri="{BB962C8B-B14F-4D97-AF65-F5344CB8AC3E}">
         <p14:creationId xmlns:p14="http://schemas.microsoft.com/office/powerpoint/2010/main" val="2413822932"/>
+      </p:ext>
+    </p:extLst>
+  </p:cSld>
+  <p:clrMapOvr>
+    <a:masterClrMapping/>
+  </p:clrMapOvr>
+</p:sld>
+</file>
+
+<file path=ppt/slides/slide12.xml><?xml version="1.0" encoding="utf-8"?>
+<p:sld xmlns:a="http://schemas.openxmlformats.org/drawingml/2006/main" xmlns:r="http://schemas.openxmlformats.org/officeDocument/2006/relationships" xmlns:p="http://schemas.openxmlformats.org/presentationml/2006/main">
+  <p:cSld>
+    <p:spTree>
+      <p:nvGrpSpPr>
+        <p:cNvPr id="1" name=""/>
+        <p:cNvGrpSpPr/>
+        <p:nvPr/>
+      </p:nvGrpSpPr>
+      <p:grpSpPr>
+        <a:xfrm>
+          <a:off x="0" y="0"/>
+          <a:ext cx="0" cy="0"/>
+          <a:chOff x="0" y="0"/>
+          <a:chExt cx="0" cy="0"/>
+        </a:xfrm>
+      </p:grpSpPr>
+      <p:sp>
+        <p:nvSpPr>
+          <p:cNvPr id="2" name="Title 1">
+            <a:extLst>
+              <a:ext uri="{FF2B5EF4-FFF2-40B4-BE49-F238E27FC236}">
+                <a16:creationId xmlns:a16="http://schemas.microsoft.com/office/drawing/2014/main" id="{45ADE233-37D2-984E-817E-BDA80B748615}"/>
+              </a:ext>
+            </a:extLst>
+          </p:cNvPr>
+          <p:cNvSpPr>
+            <a:spLocks noGrp="1"/>
+          </p:cNvSpPr>
+          <p:nvPr>
+            <p:ph type="title"/>
+          </p:nvPr>
+        </p:nvSpPr>
+        <p:spPr/>
+        <p:txBody>
+          <a:bodyPr>
+            <a:normAutofit fontScale="90000"/>
+          </a:bodyPr>
+          <a:lstStyle/>
+          <a:p>
+            <a:r>
+              <a:rPr lang="en-NO" dirty="0"/>
+              <a:t>Summary</a:t>
+            </a:r>
+          </a:p>
+        </p:txBody>
+      </p:sp>
+      <p:sp>
+        <p:nvSpPr>
+          <p:cNvPr id="3" name="Content Placeholder 2">
+            <a:extLst>
+              <a:ext uri="{FF2B5EF4-FFF2-40B4-BE49-F238E27FC236}">
+                <a16:creationId xmlns:a16="http://schemas.microsoft.com/office/drawing/2014/main" id="{B2A44ED5-C74E-194E-B204-1565EE9D524F}"/>
+              </a:ext>
+            </a:extLst>
+          </p:cNvPr>
+          <p:cNvSpPr>
+            <a:spLocks noGrp="1"/>
+          </p:cNvSpPr>
+          <p:nvPr>
+            <p:ph idx="1"/>
+          </p:nvPr>
+        </p:nvSpPr>
+        <p:spPr>
+          <a:xfrm>
+            <a:off x="479425" y="1171111"/>
+            <a:ext cx="11361476" cy="4948335"/>
+          </a:xfrm>
+        </p:spPr>
+        <p:txBody>
+          <a:bodyPr/>
+          <a:lstStyle/>
+          <a:p>
+            <a:r>
+              <a:rPr lang="en-NO" dirty="0"/>
+              <a:t>Design data structures so data used together are in the same cache line</a:t>
+            </a:r>
+          </a:p>
+          <a:p>
+            <a:endParaRPr lang="en-NO" dirty="0"/>
+          </a:p>
+          <a:p>
+            <a:r>
+              <a:rPr lang="en-NO" dirty="0"/>
+              <a:t>If this is not possible, prefer regular strides so the prefetcher can help you</a:t>
+            </a:r>
+          </a:p>
+          <a:p>
+            <a:endParaRPr lang="en-NO" dirty="0"/>
+          </a:p>
+          <a:p>
+            <a:r>
+              <a:rPr lang="en-NO" dirty="0"/>
+              <a:t>But avoid high powers-of-two strides as to not get caught out by set associativity</a:t>
+            </a:r>
+          </a:p>
+          <a:p>
+            <a:endParaRPr lang="en-NO" dirty="0"/>
+          </a:p>
+          <a:p>
+            <a:r>
+              <a:rPr lang="en-NO" dirty="0"/>
+              <a:t>Consider blocking if the problem allows for it</a:t>
+            </a:r>
+          </a:p>
+          <a:p>
+            <a:endParaRPr lang="en-NO" dirty="0"/>
+          </a:p>
+          <a:p>
+            <a:r>
+              <a:rPr lang="en-NO" dirty="0"/>
+              <a:t>Find the talk slides and code at </a:t>
+            </a:r>
+            <a:r>
+              <a:rPr lang="en-GB" dirty="0"/>
+              <a:t>https://</a:t>
+            </a:r>
+            <a:r>
+              <a:rPr lang="en-GB" dirty="0" err="1"/>
+              <a:t>github.com</a:t>
+            </a:r>
+            <a:r>
+              <a:rPr lang="en-GB" dirty="0"/>
+              <a:t>/</a:t>
+            </a:r>
+            <a:r>
+              <a:rPr lang="en-GB" dirty="0" err="1"/>
+              <a:t>runehol</a:t>
+            </a:r>
+            <a:r>
+              <a:rPr lang="en-GB" dirty="0"/>
+              <a:t>/</a:t>
+            </a:r>
+            <a:r>
+              <a:rPr lang="en-GB" dirty="0" err="1"/>
+              <a:t>cache_efficiency_talk</a:t>
+            </a:r>
+            <a:endParaRPr lang="en-NO" dirty="0"/>
+          </a:p>
+        </p:txBody>
+      </p:sp>
+    </p:spTree>
+    <p:extLst>
+      <p:ext uri="{BB962C8B-B14F-4D97-AF65-F5344CB8AC3E}">
+        <p14:creationId xmlns:p14="http://schemas.microsoft.com/office/powerpoint/2010/main" val="1805891251"/>
       </p:ext>
     </p:extLst>
   </p:cSld>
@@ -8868,7 +9242,7 @@
           <p:cNvPr id="2" name="Title 1">
             <a:extLst>
               <a:ext uri="{FF2B5EF4-FFF2-40B4-BE49-F238E27FC236}">
-                <a16:creationId xmlns:a16="http://schemas.microsoft.com/office/drawing/2014/main" id="{45ADE233-37D2-984E-817E-BDA80B748615}"/>
+                <a16:creationId xmlns:a16="http://schemas.microsoft.com/office/drawing/2014/main" id="{BC61812F-6D47-5918-115C-4A8CA6A35683}"/>
               </a:ext>
             </a:extLst>
           </p:cNvPr>
@@ -8879,7 +9253,12 @@
             <p:ph type="title"/>
           </p:nvPr>
         </p:nvSpPr>
-        <p:spPr/>
+        <p:spPr>
+          <a:xfrm>
+            <a:off x="479424" y="476250"/>
+            <a:ext cx="11442499" cy="654760"/>
+          </a:xfrm>
+        </p:spPr>
         <p:txBody>
           <a:bodyPr>
             <a:normAutofit fontScale="90000"/>
@@ -8888,7 +9267,7 @@
           <a:p>
             <a:r>
               <a:rPr lang="en-NO" dirty="0"/>
-              <a:t>Summary</a:t>
+              <a:t>One final mystery – why does DRAM speed vary?</a:t>
             </a:r>
           </a:p>
         </p:txBody>
@@ -8898,7 +9277,7 @@
           <p:cNvPr id="3" name="Content Placeholder 2">
             <a:extLst>
               <a:ext uri="{FF2B5EF4-FFF2-40B4-BE49-F238E27FC236}">
-                <a16:creationId xmlns:a16="http://schemas.microsoft.com/office/drawing/2014/main" id="{B2A44ED5-C74E-194E-B204-1565EE9D524F}"/>
+                <a16:creationId xmlns:a16="http://schemas.microsoft.com/office/drawing/2014/main" id="{DD23535A-D757-DB10-4AB3-794233D38530}"/>
               </a:ext>
             </a:extLst>
           </p:cNvPr>
@@ -8916,42 +9295,426 @@
           <a:p>
             <a:r>
               <a:rPr lang="en-NO" dirty="0"/>
-              <a:t>Design data structures so data used together are in the same cache line</a:t>
-            </a:r>
-          </a:p>
-          <a:p>
-            <a:endParaRPr lang="en-NO" dirty="0"/>
+              <a:t>In the preceding tests, we’ve seen wildly varying DRAM speeds</a:t>
+            </a:r>
           </a:p>
           <a:p>
             <a:r>
               <a:rPr lang="en-NO" dirty="0"/>
-              <a:t>If this is not possible, prefer regular strides so the prefetcher can help you</a:t>
-            </a:r>
-          </a:p>
-          <a:p>
-            <a:endParaRPr lang="en-NO" dirty="0"/>
-          </a:p>
-          <a:p>
+              <a:t>We have less variation if we consider bandwidth amplification</a:t>
+            </a:r>
+          </a:p>
+          <a:p>
+            <a:pPr lvl="1"/>
             <a:r>
               <a:rPr lang="en-NO" dirty="0"/>
-              <a:t>But avoid high powers-of-two strides to not get caught out by set associativity</a:t>
-            </a:r>
-          </a:p>
-          <a:p>
-            <a:endParaRPr lang="en-NO" dirty="0"/>
+              <a:t>If we ask for 4 bytes, and the cache line isn’t present in L1 or L2, the cache system will go and fetch 64 bytes instead of 4 bytes from DRAM</a:t>
+            </a:r>
           </a:p>
           <a:p>
             <a:r>
               <a:rPr lang="en-NO" dirty="0"/>
-              <a:t>Consider blocking if the problem allows for it</a:t>
+              <a:t>But there’s still a factor 3 difference </a:t>
             </a:r>
           </a:p>
         </p:txBody>
       </p:sp>
+      <p:graphicFrame>
+        <p:nvGraphicFramePr>
+          <p:cNvPr id="4" name="Table 4">
+            <a:extLst>
+              <a:ext uri="{FF2B5EF4-FFF2-40B4-BE49-F238E27FC236}">
+                <a16:creationId xmlns:a16="http://schemas.microsoft.com/office/drawing/2014/main" id="{DF11E9AB-DCC1-8830-6DB6-B6189359E5F5}"/>
+              </a:ext>
+            </a:extLst>
+          </p:cNvPr>
+          <p:cNvGraphicFramePr>
+            <a:graphicFrameLocks/>
+          </p:cNvGraphicFramePr>
+          <p:nvPr>
+            <p:extLst>
+              <p:ext uri="{D42A27DB-BD31-4B8C-83A1-F6EECF244321}">
+                <p14:modId xmlns:p14="http://schemas.microsoft.com/office/powerpoint/2010/main" val="4415272"/>
+              </p:ext>
+            </p:extLst>
+          </p:nvPr>
+        </p:nvGraphicFramePr>
+        <p:xfrm>
+          <a:off x="1605023" y="3645278"/>
+          <a:ext cx="8426369" cy="1737360"/>
+        </p:xfrm>
+        <a:graphic>
+          <a:graphicData uri="http://schemas.openxmlformats.org/drawingml/2006/table">
+            <a:tbl>
+              <a:tblPr firstRow="1" bandRow="1">
+                <a:tableStyleId>{B301B821-A1FF-4177-AEE7-76D212191A09}</a:tableStyleId>
+              </a:tblPr>
+              <a:tblGrid>
+                <a:gridCol w="4364226">
+                  <a:extLst>
+                    <a:ext uri="{9D8B030D-6E8A-4147-A177-3AD203B41FA5}">
+                      <a16:colId xmlns:a16="http://schemas.microsoft.com/office/drawing/2014/main" val="1709336776"/>
+                    </a:ext>
+                  </a:extLst>
+                </a:gridCol>
+                <a:gridCol w="1230042">
+                  <a:extLst>
+                    <a:ext uri="{9D8B030D-6E8A-4147-A177-3AD203B41FA5}">
+                      <a16:colId xmlns:a16="http://schemas.microsoft.com/office/drawing/2014/main" val="2642991365"/>
+                    </a:ext>
+                  </a:extLst>
+                </a:gridCol>
+                <a:gridCol w="1426943">
+                  <a:extLst>
+                    <a:ext uri="{9D8B030D-6E8A-4147-A177-3AD203B41FA5}">
+                      <a16:colId xmlns:a16="http://schemas.microsoft.com/office/drawing/2014/main" val="1176368045"/>
+                    </a:ext>
+                  </a:extLst>
+                </a:gridCol>
+                <a:gridCol w="1405158">
+                  <a:extLst>
+                    <a:ext uri="{9D8B030D-6E8A-4147-A177-3AD203B41FA5}">
+                      <a16:colId xmlns:a16="http://schemas.microsoft.com/office/drawing/2014/main" val="3048834973"/>
+                    </a:ext>
+                  </a:extLst>
+                </a:gridCol>
+              </a:tblGrid>
+              <a:tr h="451606">
+                <a:tc>
+                  <a:txBody>
+                    <a:bodyPr/>
+                    <a:lstStyle/>
+                    <a:p>
+                      <a:r>
+                        <a:rPr lang="en-NO" sz="1400" dirty="0"/>
+                        <a:t>Test</a:t>
+                      </a:r>
+                    </a:p>
+                  </a:txBody>
+                  <a:tcPr/>
+                </a:tc>
+                <a:tc>
+                  <a:txBody>
+                    <a:bodyPr/>
+                    <a:lstStyle/>
+                    <a:p>
+                      <a:r>
+                        <a:rPr lang="en-NO" sz="1400" dirty="0"/>
+                        <a:t>Ordered bandwidth</a:t>
+                      </a:r>
+                    </a:p>
+                  </a:txBody>
+                  <a:tcPr/>
+                </a:tc>
+                <a:tc>
+                  <a:txBody>
+                    <a:bodyPr/>
+                    <a:lstStyle/>
+                    <a:p>
+                      <a:r>
+                        <a:rPr lang="en-NO" sz="1400" dirty="0"/>
+                        <a:t>Bandwidth amplification</a:t>
+                      </a:r>
+                    </a:p>
+                  </a:txBody>
+                  <a:tcPr/>
+                </a:tc>
+                <a:tc>
+                  <a:txBody>
+                    <a:bodyPr/>
+                    <a:lstStyle/>
+                    <a:p>
+                      <a:r>
+                        <a:rPr lang="en-NO" sz="1400" dirty="0"/>
+                        <a:t>Actual bandwidth</a:t>
+                      </a:r>
+                    </a:p>
+                  </a:txBody>
+                  <a:tcPr/>
+                </a:tc>
+                <a:extLst>
+                  <a:ext uri="{0D108BD9-81ED-4DB2-BD59-A6C34878D82A}">
+                    <a16:rowId xmlns:a16="http://schemas.microsoft.com/office/drawing/2014/main" val="2834024377"/>
+                  </a:ext>
+                </a:extLst>
+              </a:tr>
+              <a:tr h="265651">
+                <a:tc>
+                  <a:txBody>
+                    <a:bodyPr/>
+                    <a:lstStyle/>
+                    <a:p>
+                      <a:r>
+                        <a:rPr lang="en-GB" sz="1400" dirty="0" err="1"/>
+                        <a:t>benchmark_sum_inner_to_outer</a:t>
+                      </a:r>
+                      <a:r>
+                        <a:rPr lang="en-GB" sz="1400" dirty="0"/>
+                        <a:t>/1000/1000    </a:t>
+                      </a:r>
+                      <a:endParaRPr lang="en-NO" sz="1400" dirty="0"/>
+                    </a:p>
+                  </a:txBody>
+                  <a:tcPr/>
+                </a:tc>
+                <a:tc>
+                  <a:txBody>
+                    <a:bodyPr/>
+                    <a:lstStyle/>
+                    <a:p>
+                      <a:pPr algn="r"/>
+                      <a:r>
+                        <a:rPr lang="en-NO" sz="1400" dirty="0"/>
+                        <a:t>1080 MB/s</a:t>
+                      </a:r>
+                    </a:p>
+                  </a:txBody>
+                  <a:tcPr/>
+                </a:tc>
+                <a:tc>
+                  <a:txBody>
+                    <a:bodyPr/>
+                    <a:lstStyle/>
+                    <a:p>
+                      <a:pPr algn="r"/>
+                      <a:r>
+                        <a:rPr lang="en-GB" sz="1400" dirty="0"/>
+                        <a:t>64/64</a:t>
+                      </a:r>
+                      <a:endParaRPr lang="en-NO" sz="1400" dirty="0"/>
+                    </a:p>
+                  </a:txBody>
+                  <a:tcPr/>
+                </a:tc>
+                <a:tc>
+                  <a:txBody>
+                    <a:bodyPr/>
+                    <a:lstStyle/>
+                    <a:p>
+                      <a:pPr algn="r"/>
+                      <a:r>
+                        <a:rPr lang="en-NO" sz="1400" dirty="0"/>
+                        <a:t>1080 MB/s</a:t>
+                      </a:r>
+                    </a:p>
+                  </a:txBody>
+                  <a:tcPr/>
+                </a:tc>
+                <a:extLst>
+                  <a:ext uri="{0D108BD9-81ED-4DB2-BD59-A6C34878D82A}">
+                    <a16:rowId xmlns:a16="http://schemas.microsoft.com/office/drawing/2014/main" val="3124958658"/>
+                  </a:ext>
+                </a:extLst>
+              </a:tr>
+              <a:tr h="265651">
+                <a:tc>
+                  <a:txBody>
+                    <a:bodyPr/>
+                    <a:lstStyle/>
+                    <a:p>
+                      <a:r>
+                        <a:rPr lang="en-GB" sz="1400" dirty="0" err="1"/>
+                        <a:t>benchmark_sum_outer_to_inner</a:t>
+                      </a:r>
+                      <a:r>
+                        <a:rPr lang="en-GB" sz="1400" dirty="0"/>
+                        <a:t>/1000/1024  </a:t>
+                      </a:r>
+                      <a:endParaRPr lang="en-NO" sz="1400" dirty="0"/>
+                    </a:p>
+                  </a:txBody>
+                  <a:tcPr/>
+                </a:tc>
+                <a:tc>
+                  <a:txBody>
+                    <a:bodyPr/>
+                    <a:lstStyle/>
+                    <a:p>
+                      <a:pPr algn="r"/>
+                      <a:r>
+                        <a:rPr lang="en-NO" sz="1400" dirty="0"/>
+                        <a:t>22.5 MB/s</a:t>
+                      </a:r>
+                    </a:p>
+                  </a:txBody>
+                  <a:tcPr/>
+                </a:tc>
+                <a:tc>
+                  <a:txBody>
+                    <a:bodyPr/>
+                    <a:lstStyle/>
+                    <a:p>
+                      <a:pPr algn="r"/>
+                      <a:r>
+                        <a:rPr lang="en-NO" sz="1400" dirty="0"/>
+                        <a:t>64/4</a:t>
+                      </a:r>
+                    </a:p>
+                  </a:txBody>
+                  <a:tcPr/>
+                </a:tc>
+                <a:tc>
+                  <a:txBody>
+                    <a:bodyPr/>
+                    <a:lstStyle/>
+                    <a:p>
+                      <a:pPr algn="r"/>
+                      <a:r>
+                        <a:rPr lang="en-NO" sz="1400" dirty="0"/>
+                        <a:t>360 MB/s</a:t>
+                      </a:r>
+                    </a:p>
+                  </a:txBody>
+                  <a:tcPr/>
+                </a:tc>
+                <a:extLst>
+                  <a:ext uri="{0D108BD9-81ED-4DB2-BD59-A6C34878D82A}">
+                    <a16:rowId xmlns:a16="http://schemas.microsoft.com/office/drawing/2014/main" val="2219301568"/>
+                  </a:ext>
+                </a:extLst>
+              </a:tr>
+              <a:tr h="265651">
+                <a:tc>
+                  <a:txBody>
+                    <a:bodyPr/>
+                    <a:lstStyle/>
+                    <a:p>
+                      <a:r>
+                        <a:rPr lang="en-GB" sz="1400" dirty="0" err="1"/>
+                        <a:t>benchmark_sum_random</a:t>
+                      </a:r>
+                      <a:r>
+                        <a:rPr lang="en-GB" sz="1400" dirty="0"/>
+                        <a:t>/1000/1000           </a:t>
+                      </a:r>
+                      <a:endParaRPr lang="en-NO" sz="1400" dirty="0"/>
+                    </a:p>
+                  </a:txBody>
+                  <a:tcPr/>
+                </a:tc>
+                <a:tc>
+                  <a:txBody>
+                    <a:bodyPr/>
+                    <a:lstStyle/>
+                    <a:p>
+                      <a:pPr algn="r"/>
+                      <a:r>
+                        <a:rPr lang="en-NO" sz="1400" dirty="0"/>
+                        <a:t>42.5 MB/s</a:t>
+                      </a:r>
+                    </a:p>
+                  </a:txBody>
+                  <a:tcPr/>
+                </a:tc>
+                <a:tc>
+                  <a:txBody>
+                    <a:bodyPr/>
+                    <a:lstStyle/>
+                    <a:p>
+                      <a:pPr algn="r"/>
+                      <a:r>
+                        <a:rPr lang="en-NO" sz="1400" dirty="0"/>
+                        <a:t>64/4</a:t>
+                      </a:r>
+                    </a:p>
+                  </a:txBody>
+                  <a:tcPr/>
+                </a:tc>
+                <a:tc>
+                  <a:txBody>
+                    <a:bodyPr/>
+                    <a:lstStyle/>
+                    <a:p>
+                      <a:pPr algn="r"/>
+                      <a:r>
+                        <a:rPr lang="en-NO" sz="1400" dirty="0"/>
+                        <a:t>680 MB/s</a:t>
+                      </a:r>
+                    </a:p>
+                  </a:txBody>
+                  <a:tcPr/>
+                </a:tc>
+                <a:extLst>
+                  <a:ext uri="{0D108BD9-81ED-4DB2-BD59-A6C34878D82A}">
+                    <a16:rowId xmlns:a16="http://schemas.microsoft.com/office/drawing/2014/main" val="2843204854"/>
+                  </a:ext>
+                </a:extLst>
+              </a:tr>
+              <a:tr h="265651">
+                <a:tc>
+                  <a:txBody>
+                    <a:bodyPr/>
+                    <a:lstStyle/>
+                    <a:p>
+                      <a:r>
+                        <a:rPr lang="en-GB" sz="1400" dirty="0" err="1"/>
+                        <a:t>benchmark_sum_random</a:t>
+                      </a:r>
+                      <a:r>
+                        <a:rPr lang="en-GB" sz="1400" dirty="0"/>
+                        <a:t>/10000/1000        </a:t>
+                      </a:r>
+                      <a:endParaRPr lang="en-NO" sz="1400" dirty="0"/>
+                    </a:p>
+                  </a:txBody>
+                  <a:tcPr/>
+                </a:tc>
+                <a:tc>
+                  <a:txBody>
+                    <a:bodyPr/>
+                    <a:lstStyle/>
+                    <a:p>
+                      <a:pPr algn="r"/>
+                      <a:r>
+                        <a:rPr lang="en-NO" sz="1400" dirty="0"/>
+                        <a:t>21 MB/s</a:t>
+                      </a:r>
+                    </a:p>
+                  </a:txBody>
+                  <a:tcPr/>
+                </a:tc>
+                <a:tc>
+                  <a:txBody>
+                    <a:bodyPr/>
+                    <a:lstStyle/>
+                    <a:p>
+                      <a:pPr algn="r"/>
+                      <a:r>
+                        <a:rPr lang="en-NO" sz="1400" dirty="0"/>
+                        <a:t>64/4</a:t>
+                      </a:r>
+                    </a:p>
+                  </a:txBody>
+                  <a:tcPr/>
+                </a:tc>
+                <a:tc>
+                  <a:txBody>
+                    <a:bodyPr/>
+                    <a:lstStyle/>
+                    <a:p>
+                      <a:pPr algn="r"/>
+                      <a:r>
+                        <a:rPr lang="en-NO" sz="1400" dirty="0"/>
+                        <a:t>336 MB/s</a:t>
+                      </a:r>
+                    </a:p>
+                  </a:txBody>
+                  <a:tcPr/>
+                </a:tc>
+                <a:extLst>
+                  <a:ext uri="{0D108BD9-81ED-4DB2-BD59-A6C34878D82A}">
+                    <a16:rowId xmlns:a16="http://schemas.microsoft.com/office/drawing/2014/main" val="918846867"/>
+                  </a:ext>
+                </a:extLst>
+              </a:tr>
+            </a:tbl>
+          </a:graphicData>
+        </a:graphic>
+      </p:graphicFrame>
     </p:spTree>
     <p:extLst>
       <p:ext uri="{BB962C8B-B14F-4D97-AF65-F5344CB8AC3E}">
-        <p14:creationId xmlns:p14="http://schemas.microsoft.com/office/powerpoint/2010/main" val="1805891251"/>
+        <p14:creationId xmlns:p14="http://schemas.microsoft.com/office/powerpoint/2010/main" val="2593239724"/>
       </p:ext>
     </p:extLst>
   </p:cSld>

</xml_diff>